<commit_message>
Calculated TN:TP ratios. Made figures for TN:TP, do, chla, turb, cond
</commit_message>
<xml_diff>
--- a/03_figures/WinterN_Results_2018-07-04.pptx
+++ b/03_figures/WinterN_Results_2018-07-04.pptx
@@ -5,10 +5,13 @@
     <p:sldMasterId id="2147483648" r:id="rId1"/>
   </p:sldMasterIdLst>
   <p:sldIdLst>
-    <p:sldId id="258" r:id="rId2"/>
-    <p:sldId id="256" r:id="rId3"/>
-    <p:sldId id="259" r:id="rId4"/>
-    <p:sldId id="257" r:id="rId5"/>
+    <p:sldId id="260" r:id="rId2"/>
+    <p:sldId id="261" r:id="rId3"/>
+    <p:sldId id="262" r:id="rId4"/>
+    <p:sldId id="258" r:id="rId5"/>
+    <p:sldId id="256" r:id="rId6"/>
+    <p:sldId id="259" r:id="rId7"/>
+    <p:sldId id="257" r:id="rId8"/>
   </p:sldIdLst>
   <p:sldSz cx="9144000" cy="6858000" type="screen4x3"/>
   <p:notesSz cx="6858000" cy="9144000"/>
@@ -107,6 +110,22 @@
       </a:defRPr>
     </a:lvl9pPr>
   </p:defaultTextStyle>
+  <p:extLst>
+    <p:ext uri="{EFAFB233-063F-42B5-8137-9DF3F51BA10A}">
+      <p15:sldGuideLst xmlns:p15="http://schemas.microsoft.com/office/powerpoint/2012/main">
+        <p15:guide id="1" orient="horz" pos="2160">
+          <p15:clr>
+            <a:srgbClr val="A4A3A4"/>
+          </p15:clr>
+        </p15:guide>
+        <p15:guide id="2" pos="2880">
+          <p15:clr>
+            <a:srgbClr val="A4A3A4"/>
+          </p15:clr>
+        </p15:guide>
+      </p15:sldGuideLst>
+    </p:ext>
+  </p:extLst>
 </p:presentation>
 </file>
 
@@ -148,10 +167,9 @@
           <a:lstStyle/>
           <a:p>
             <a:r>
-              <a:rPr lang="en-US" smtClean="0"/>
+              <a:rPr lang="en-US"/>
               <a:t>Click to edit Master title style</a:t>
             </a:r>
-            <a:endParaRPr lang="en-US"/>
           </a:p>
         </p:txBody>
       </p:sp>
@@ -267,10 +285,9 @@
           </a:lstStyle>
           <a:p>
             <a:r>
-              <a:rPr lang="en-US" smtClean="0"/>
+              <a:rPr lang="en-US"/>
               <a:t>Click to edit Master subtitle style</a:t>
             </a:r>
-            <a:endParaRPr lang="en-US"/>
           </a:p>
         </p:txBody>
       </p:sp>
@@ -291,7 +308,7 @@
           <a:p>
             <a:fld id="{229F9254-BB35-7742-B6B6-8314049D96F5}" type="datetimeFigureOut">
               <a:rPr lang="en-US" smtClean="0"/>
-              <a:t>7/4/18</a:t>
+              <a:t>12/20/18</a:t>
             </a:fld>
             <a:endParaRPr lang="en-US"/>
           </a:p>
@@ -385,10 +402,9 @@
           <a:lstStyle/>
           <a:p>
             <a:r>
-              <a:rPr lang="en-US" smtClean="0"/>
+              <a:rPr lang="en-US"/>
               <a:t>Click to edit Master title style</a:t>
             </a:r>
-            <a:endParaRPr lang="en-US"/>
           </a:p>
         </p:txBody>
       </p:sp>
@@ -409,38 +425,37 @@
           <a:p>
             <a:pPr lvl="0"/>
             <a:r>
-              <a:rPr lang="en-US" smtClean="0"/>
+              <a:rPr lang="en-US"/>
               <a:t>Click to edit Master text styles</a:t>
             </a:r>
           </a:p>
           <a:p>
             <a:pPr lvl="1"/>
             <a:r>
-              <a:rPr lang="en-US" smtClean="0"/>
+              <a:rPr lang="en-US"/>
               <a:t>Second level</a:t>
             </a:r>
           </a:p>
           <a:p>
             <a:pPr lvl="2"/>
             <a:r>
-              <a:rPr lang="en-US" smtClean="0"/>
+              <a:rPr lang="en-US"/>
               <a:t>Third level</a:t>
             </a:r>
           </a:p>
           <a:p>
             <a:pPr lvl="3"/>
             <a:r>
-              <a:rPr lang="en-US" smtClean="0"/>
+              <a:rPr lang="en-US"/>
               <a:t>Fourth level</a:t>
             </a:r>
           </a:p>
           <a:p>
             <a:pPr lvl="4"/>
             <a:r>
-              <a:rPr lang="en-US" smtClean="0"/>
+              <a:rPr lang="en-US"/>
               <a:t>Fifth level</a:t>
             </a:r>
-            <a:endParaRPr lang="en-US"/>
           </a:p>
         </p:txBody>
       </p:sp>
@@ -461,7 +476,7 @@
           <a:p>
             <a:fld id="{229F9254-BB35-7742-B6B6-8314049D96F5}" type="datetimeFigureOut">
               <a:rPr lang="en-US" smtClean="0"/>
-              <a:t>7/4/18</a:t>
+              <a:t>12/20/18</a:t>
             </a:fld>
             <a:endParaRPr lang="en-US"/>
           </a:p>
@@ -560,10 +575,9 @@
           <a:lstStyle/>
           <a:p>
             <a:r>
-              <a:rPr lang="en-US" smtClean="0"/>
+              <a:rPr lang="en-US"/>
               <a:t>Click to edit Master title style</a:t>
             </a:r>
-            <a:endParaRPr lang="en-US"/>
           </a:p>
         </p:txBody>
       </p:sp>
@@ -589,38 +603,37 @@
           <a:p>
             <a:pPr lvl="0"/>
             <a:r>
-              <a:rPr lang="en-US" smtClean="0"/>
+              <a:rPr lang="en-US"/>
               <a:t>Click to edit Master text styles</a:t>
             </a:r>
           </a:p>
           <a:p>
             <a:pPr lvl="1"/>
             <a:r>
-              <a:rPr lang="en-US" smtClean="0"/>
+              <a:rPr lang="en-US"/>
               <a:t>Second level</a:t>
             </a:r>
           </a:p>
           <a:p>
             <a:pPr lvl="2"/>
             <a:r>
-              <a:rPr lang="en-US" smtClean="0"/>
+              <a:rPr lang="en-US"/>
               <a:t>Third level</a:t>
             </a:r>
           </a:p>
           <a:p>
             <a:pPr lvl="3"/>
             <a:r>
-              <a:rPr lang="en-US" smtClean="0"/>
+              <a:rPr lang="en-US"/>
               <a:t>Fourth level</a:t>
             </a:r>
           </a:p>
           <a:p>
             <a:pPr lvl="4"/>
             <a:r>
-              <a:rPr lang="en-US" smtClean="0"/>
+              <a:rPr lang="en-US"/>
               <a:t>Fifth level</a:t>
             </a:r>
-            <a:endParaRPr lang="en-US"/>
           </a:p>
         </p:txBody>
       </p:sp>
@@ -641,7 +654,7 @@
           <a:p>
             <a:fld id="{229F9254-BB35-7742-B6B6-8314049D96F5}" type="datetimeFigureOut">
               <a:rPr lang="en-US" smtClean="0"/>
-              <a:t>7/4/18</a:t>
+              <a:t>12/20/18</a:t>
             </a:fld>
             <a:endParaRPr lang="en-US"/>
           </a:p>
@@ -735,10 +748,9 @@
           <a:lstStyle/>
           <a:p>
             <a:r>
-              <a:rPr lang="en-US" smtClean="0"/>
+              <a:rPr lang="en-US"/>
               <a:t>Click to edit Master title style</a:t>
             </a:r>
-            <a:endParaRPr lang="en-US"/>
           </a:p>
         </p:txBody>
       </p:sp>
@@ -759,38 +771,37 @@
           <a:p>
             <a:pPr lvl="0"/>
             <a:r>
-              <a:rPr lang="en-US" smtClean="0"/>
+              <a:rPr lang="en-US"/>
               <a:t>Click to edit Master text styles</a:t>
             </a:r>
           </a:p>
           <a:p>
             <a:pPr lvl="1"/>
             <a:r>
-              <a:rPr lang="en-US" smtClean="0"/>
+              <a:rPr lang="en-US"/>
               <a:t>Second level</a:t>
             </a:r>
           </a:p>
           <a:p>
             <a:pPr lvl="2"/>
             <a:r>
-              <a:rPr lang="en-US" smtClean="0"/>
+              <a:rPr lang="en-US"/>
               <a:t>Third level</a:t>
             </a:r>
           </a:p>
           <a:p>
             <a:pPr lvl="3"/>
             <a:r>
-              <a:rPr lang="en-US" smtClean="0"/>
+              <a:rPr lang="en-US"/>
               <a:t>Fourth level</a:t>
             </a:r>
           </a:p>
           <a:p>
             <a:pPr lvl="4"/>
             <a:r>
-              <a:rPr lang="en-US" smtClean="0"/>
+              <a:rPr lang="en-US"/>
               <a:t>Fifth level</a:t>
             </a:r>
-            <a:endParaRPr lang="en-US"/>
           </a:p>
         </p:txBody>
       </p:sp>
@@ -811,7 +822,7 @@
           <a:p>
             <a:fld id="{229F9254-BB35-7742-B6B6-8314049D96F5}" type="datetimeFigureOut">
               <a:rPr lang="en-US" smtClean="0"/>
-              <a:t>7/4/18</a:t>
+              <a:t>12/20/18</a:t>
             </a:fld>
             <a:endParaRPr lang="en-US"/>
           </a:p>
@@ -914,10 +925,9 @@
           </a:lstStyle>
           <a:p>
             <a:r>
-              <a:rPr lang="en-US" smtClean="0"/>
+              <a:rPr lang="en-US"/>
               <a:t>Click to edit Master title style</a:t>
             </a:r>
-            <a:endParaRPr lang="en-US"/>
           </a:p>
         </p:txBody>
       </p:sp>
@@ -1034,7 +1044,7 @@
           <a:p>
             <a:pPr lvl="0"/>
             <a:r>
-              <a:rPr lang="en-US" smtClean="0"/>
+              <a:rPr lang="en-US"/>
               <a:t>Click to edit Master text styles</a:t>
             </a:r>
           </a:p>
@@ -1057,7 +1067,7 @@
           <a:p>
             <a:fld id="{229F9254-BB35-7742-B6B6-8314049D96F5}" type="datetimeFigureOut">
               <a:rPr lang="en-US" smtClean="0"/>
-              <a:t>7/4/18</a:t>
+              <a:t>12/20/18</a:t>
             </a:fld>
             <a:endParaRPr lang="en-US"/>
           </a:p>
@@ -1151,10 +1161,9 @@
           <a:lstStyle/>
           <a:p>
             <a:r>
-              <a:rPr lang="en-US" smtClean="0"/>
+              <a:rPr lang="en-US"/>
               <a:t>Click to edit Master title style</a:t>
             </a:r>
-            <a:endParaRPr lang="en-US"/>
           </a:p>
         </p:txBody>
       </p:sp>
@@ -1208,38 +1217,37 @@
           <a:p>
             <a:pPr lvl="0"/>
             <a:r>
-              <a:rPr lang="en-US" smtClean="0"/>
+              <a:rPr lang="en-US"/>
               <a:t>Click to edit Master text styles</a:t>
             </a:r>
           </a:p>
           <a:p>
             <a:pPr lvl="1"/>
             <a:r>
-              <a:rPr lang="en-US" smtClean="0"/>
+              <a:rPr lang="en-US"/>
               <a:t>Second level</a:t>
             </a:r>
           </a:p>
           <a:p>
             <a:pPr lvl="2"/>
             <a:r>
-              <a:rPr lang="en-US" smtClean="0"/>
+              <a:rPr lang="en-US"/>
               <a:t>Third level</a:t>
             </a:r>
           </a:p>
           <a:p>
             <a:pPr lvl="3"/>
             <a:r>
-              <a:rPr lang="en-US" smtClean="0"/>
+              <a:rPr lang="en-US"/>
               <a:t>Fourth level</a:t>
             </a:r>
           </a:p>
           <a:p>
             <a:pPr lvl="4"/>
             <a:r>
-              <a:rPr lang="en-US" smtClean="0"/>
+              <a:rPr lang="en-US"/>
               <a:t>Fifth level</a:t>
             </a:r>
-            <a:endParaRPr lang="en-US"/>
           </a:p>
         </p:txBody>
       </p:sp>
@@ -1293,38 +1301,37 @@
           <a:p>
             <a:pPr lvl="0"/>
             <a:r>
-              <a:rPr lang="en-US" smtClean="0"/>
+              <a:rPr lang="en-US"/>
               <a:t>Click to edit Master text styles</a:t>
             </a:r>
           </a:p>
           <a:p>
             <a:pPr lvl="1"/>
             <a:r>
-              <a:rPr lang="en-US" smtClean="0"/>
+              <a:rPr lang="en-US"/>
               <a:t>Second level</a:t>
             </a:r>
           </a:p>
           <a:p>
             <a:pPr lvl="2"/>
             <a:r>
-              <a:rPr lang="en-US" smtClean="0"/>
+              <a:rPr lang="en-US"/>
               <a:t>Third level</a:t>
             </a:r>
           </a:p>
           <a:p>
             <a:pPr lvl="3"/>
             <a:r>
-              <a:rPr lang="en-US" smtClean="0"/>
+              <a:rPr lang="en-US"/>
               <a:t>Fourth level</a:t>
             </a:r>
           </a:p>
           <a:p>
             <a:pPr lvl="4"/>
             <a:r>
-              <a:rPr lang="en-US" smtClean="0"/>
+              <a:rPr lang="en-US"/>
               <a:t>Fifth level</a:t>
             </a:r>
-            <a:endParaRPr lang="en-US"/>
           </a:p>
         </p:txBody>
       </p:sp>
@@ -1345,7 +1352,7 @@
           <a:p>
             <a:fld id="{229F9254-BB35-7742-B6B6-8314049D96F5}" type="datetimeFigureOut">
               <a:rPr lang="en-US" smtClean="0"/>
-              <a:t>7/4/18</a:t>
+              <a:t>12/20/18</a:t>
             </a:fld>
             <a:endParaRPr lang="en-US"/>
           </a:p>
@@ -1443,10 +1450,9 @@
           </a:lstStyle>
           <a:p>
             <a:r>
-              <a:rPr lang="en-US" smtClean="0"/>
+              <a:rPr lang="en-US"/>
               <a:t>Click to edit Master title style</a:t>
             </a:r>
-            <a:endParaRPr lang="en-US"/>
           </a:p>
         </p:txBody>
       </p:sp>
@@ -1509,7 +1515,7 @@
           <a:p>
             <a:pPr lvl="0"/>
             <a:r>
-              <a:rPr lang="en-US" smtClean="0"/>
+              <a:rPr lang="en-US"/>
               <a:t>Click to edit Master text styles</a:t>
             </a:r>
           </a:p>
@@ -1565,38 +1571,37 @@
           <a:p>
             <a:pPr lvl="0"/>
             <a:r>
-              <a:rPr lang="en-US" smtClean="0"/>
+              <a:rPr lang="en-US"/>
               <a:t>Click to edit Master text styles</a:t>
             </a:r>
           </a:p>
           <a:p>
             <a:pPr lvl="1"/>
             <a:r>
-              <a:rPr lang="en-US" smtClean="0"/>
+              <a:rPr lang="en-US"/>
               <a:t>Second level</a:t>
             </a:r>
           </a:p>
           <a:p>
             <a:pPr lvl="2"/>
             <a:r>
-              <a:rPr lang="en-US" smtClean="0"/>
+              <a:rPr lang="en-US"/>
               <a:t>Third level</a:t>
             </a:r>
           </a:p>
           <a:p>
             <a:pPr lvl="3"/>
             <a:r>
-              <a:rPr lang="en-US" smtClean="0"/>
+              <a:rPr lang="en-US"/>
               <a:t>Fourth level</a:t>
             </a:r>
           </a:p>
           <a:p>
             <a:pPr lvl="4"/>
             <a:r>
-              <a:rPr lang="en-US" smtClean="0"/>
+              <a:rPr lang="en-US"/>
               <a:t>Fifth level</a:t>
             </a:r>
-            <a:endParaRPr lang="en-US"/>
           </a:p>
         </p:txBody>
       </p:sp>
@@ -1659,7 +1664,7 @@
           <a:p>
             <a:pPr lvl="0"/>
             <a:r>
-              <a:rPr lang="en-US" smtClean="0"/>
+              <a:rPr lang="en-US"/>
               <a:t>Click to edit Master text styles</a:t>
             </a:r>
           </a:p>
@@ -1715,38 +1720,37 @@
           <a:p>
             <a:pPr lvl="0"/>
             <a:r>
-              <a:rPr lang="en-US" smtClean="0"/>
+              <a:rPr lang="en-US"/>
               <a:t>Click to edit Master text styles</a:t>
             </a:r>
           </a:p>
           <a:p>
             <a:pPr lvl="1"/>
             <a:r>
-              <a:rPr lang="en-US" smtClean="0"/>
+              <a:rPr lang="en-US"/>
               <a:t>Second level</a:t>
             </a:r>
           </a:p>
           <a:p>
             <a:pPr lvl="2"/>
             <a:r>
-              <a:rPr lang="en-US" smtClean="0"/>
+              <a:rPr lang="en-US"/>
               <a:t>Third level</a:t>
             </a:r>
           </a:p>
           <a:p>
             <a:pPr lvl="3"/>
             <a:r>
-              <a:rPr lang="en-US" smtClean="0"/>
+              <a:rPr lang="en-US"/>
               <a:t>Fourth level</a:t>
             </a:r>
           </a:p>
           <a:p>
             <a:pPr lvl="4"/>
             <a:r>
-              <a:rPr lang="en-US" smtClean="0"/>
+              <a:rPr lang="en-US"/>
               <a:t>Fifth level</a:t>
             </a:r>
-            <a:endParaRPr lang="en-US"/>
           </a:p>
         </p:txBody>
       </p:sp>
@@ -1767,7 +1771,7 @@
           <a:p>
             <a:fld id="{229F9254-BB35-7742-B6B6-8314049D96F5}" type="datetimeFigureOut">
               <a:rPr lang="en-US" smtClean="0"/>
-              <a:t>7/4/18</a:t>
+              <a:t>12/20/18</a:t>
             </a:fld>
             <a:endParaRPr lang="en-US"/>
           </a:p>
@@ -1861,10 +1865,9 @@
           <a:lstStyle/>
           <a:p>
             <a:r>
-              <a:rPr lang="en-US" smtClean="0"/>
+              <a:rPr lang="en-US"/>
               <a:t>Click to edit Master title style</a:t>
             </a:r>
-            <a:endParaRPr lang="en-US"/>
           </a:p>
         </p:txBody>
       </p:sp>
@@ -1885,7 +1888,7 @@
           <a:p>
             <a:fld id="{229F9254-BB35-7742-B6B6-8314049D96F5}" type="datetimeFigureOut">
               <a:rPr lang="en-US" smtClean="0"/>
-              <a:t>7/4/18</a:t>
+              <a:t>12/20/18</a:t>
             </a:fld>
             <a:endParaRPr lang="en-US"/>
           </a:p>
@@ -1980,7 +1983,7 @@
           <a:p>
             <a:fld id="{229F9254-BB35-7742-B6B6-8314049D96F5}" type="datetimeFigureOut">
               <a:rPr lang="en-US" smtClean="0"/>
-              <a:t>7/4/18</a:t>
+              <a:t>12/20/18</a:t>
             </a:fld>
             <a:endParaRPr lang="en-US"/>
           </a:p>
@@ -2083,10 +2086,9 @@
           </a:lstStyle>
           <a:p>
             <a:r>
-              <a:rPr lang="en-US" smtClean="0"/>
+              <a:rPr lang="en-US"/>
               <a:t>Click to edit Master title style</a:t>
             </a:r>
-            <a:endParaRPr lang="en-US"/>
           </a:p>
         </p:txBody>
       </p:sp>
@@ -2140,38 +2142,37 @@
           <a:p>
             <a:pPr lvl="0"/>
             <a:r>
-              <a:rPr lang="en-US" smtClean="0"/>
+              <a:rPr lang="en-US"/>
               <a:t>Click to edit Master text styles</a:t>
             </a:r>
           </a:p>
           <a:p>
             <a:pPr lvl="1"/>
             <a:r>
-              <a:rPr lang="en-US" smtClean="0"/>
+              <a:rPr lang="en-US"/>
               <a:t>Second level</a:t>
             </a:r>
           </a:p>
           <a:p>
             <a:pPr lvl="2"/>
             <a:r>
-              <a:rPr lang="en-US" smtClean="0"/>
+              <a:rPr lang="en-US"/>
               <a:t>Third level</a:t>
             </a:r>
           </a:p>
           <a:p>
             <a:pPr lvl="3"/>
             <a:r>
-              <a:rPr lang="en-US" smtClean="0"/>
+              <a:rPr lang="en-US"/>
               <a:t>Fourth level</a:t>
             </a:r>
           </a:p>
           <a:p>
             <a:pPr lvl="4"/>
             <a:r>
-              <a:rPr lang="en-US" smtClean="0"/>
+              <a:rPr lang="en-US"/>
               <a:t>Fifth level</a:t>
             </a:r>
-            <a:endParaRPr lang="en-US"/>
           </a:p>
         </p:txBody>
       </p:sp>
@@ -2234,7 +2235,7 @@
           <a:p>
             <a:pPr lvl="0"/>
             <a:r>
-              <a:rPr lang="en-US" smtClean="0"/>
+              <a:rPr lang="en-US"/>
               <a:t>Click to edit Master text styles</a:t>
             </a:r>
           </a:p>
@@ -2257,7 +2258,7 @@
           <a:p>
             <a:fld id="{229F9254-BB35-7742-B6B6-8314049D96F5}" type="datetimeFigureOut">
               <a:rPr lang="en-US" smtClean="0"/>
-              <a:t>7/4/18</a:t>
+              <a:t>12/20/18</a:t>
             </a:fld>
             <a:endParaRPr lang="en-US"/>
           </a:p>
@@ -2360,10 +2361,9 @@
           </a:lstStyle>
           <a:p>
             <a:r>
-              <a:rPr lang="en-US" smtClean="0"/>
+              <a:rPr lang="en-US"/>
               <a:t>Click to edit Master title style</a:t>
             </a:r>
-            <a:endParaRPr lang="en-US"/>
           </a:p>
         </p:txBody>
       </p:sp>
@@ -2487,7 +2487,7 @@
           <a:p>
             <a:pPr lvl="0"/>
             <a:r>
-              <a:rPr lang="en-US" smtClean="0"/>
+              <a:rPr lang="en-US"/>
               <a:t>Click to edit Master text styles</a:t>
             </a:r>
           </a:p>
@@ -2510,7 +2510,7 @@
           <a:p>
             <a:fld id="{229F9254-BB35-7742-B6B6-8314049D96F5}" type="datetimeFigureOut">
               <a:rPr lang="en-US" smtClean="0"/>
-              <a:t>7/4/18</a:t>
+              <a:t>12/20/18</a:t>
             </a:fld>
             <a:endParaRPr lang="en-US"/>
           </a:p>
@@ -2619,10 +2619,9 @@
           <a:lstStyle/>
           <a:p>
             <a:r>
-              <a:rPr lang="en-US" smtClean="0"/>
+              <a:rPr lang="en-US"/>
               <a:t>Click to edit Master title style</a:t>
             </a:r>
-            <a:endParaRPr lang="en-US"/>
           </a:p>
         </p:txBody>
       </p:sp>
@@ -2653,38 +2652,37 @@
           <a:p>
             <a:pPr lvl="0"/>
             <a:r>
-              <a:rPr lang="en-US" smtClean="0"/>
+              <a:rPr lang="en-US"/>
               <a:t>Click to edit Master text styles</a:t>
             </a:r>
           </a:p>
           <a:p>
             <a:pPr lvl="1"/>
             <a:r>
-              <a:rPr lang="en-US" smtClean="0"/>
+              <a:rPr lang="en-US"/>
               <a:t>Second level</a:t>
             </a:r>
           </a:p>
           <a:p>
             <a:pPr lvl="2"/>
             <a:r>
-              <a:rPr lang="en-US" smtClean="0"/>
+              <a:rPr lang="en-US"/>
               <a:t>Third level</a:t>
             </a:r>
           </a:p>
           <a:p>
             <a:pPr lvl="3"/>
             <a:r>
-              <a:rPr lang="en-US" smtClean="0"/>
+              <a:rPr lang="en-US"/>
               <a:t>Fourth level</a:t>
             </a:r>
           </a:p>
           <a:p>
             <a:pPr lvl="4"/>
             <a:r>
-              <a:rPr lang="en-US" smtClean="0"/>
+              <a:rPr lang="en-US"/>
               <a:t>Fifth level</a:t>
             </a:r>
-            <a:endParaRPr lang="en-US"/>
           </a:p>
         </p:txBody>
       </p:sp>
@@ -2723,7 +2721,7 @@
           <a:p>
             <a:fld id="{229F9254-BB35-7742-B6B6-8314049D96F5}" type="datetimeFigureOut">
               <a:rPr lang="en-US" smtClean="0"/>
-              <a:t>7/4/18</a:t>
+              <a:t>12/20/18</a:t>
             </a:fld>
             <a:endParaRPr lang="en-US"/>
           </a:p>
@@ -3098,6 +3096,703 @@
           <a:chExt cx="0" cy="0"/>
         </a:xfrm>
       </p:grpSpPr>
+      <p:sp>
+        <p:nvSpPr>
+          <p:cNvPr id="2" name="TextBox 1">
+            <a:extLst>
+              <a:ext uri="{FF2B5EF4-FFF2-40B4-BE49-F238E27FC236}">
+                <a16:creationId xmlns:a16="http://schemas.microsoft.com/office/drawing/2014/main" id="{F95E832A-B677-2C4D-9C07-79642561FDBD}"/>
+              </a:ext>
+            </a:extLst>
+          </p:cNvPr>
+          <p:cNvSpPr txBox="1"/>
+          <p:nvPr/>
+        </p:nvSpPr>
+        <p:spPr>
+          <a:xfrm>
+            <a:off x="0" y="118348"/>
+            <a:ext cx="1616661" cy="646331"/>
+          </a:xfrm>
+          <a:prstGeom prst="rect">
+            <a:avLst/>
+          </a:prstGeom>
+          <a:noFill/>
+        </p:spPr>
+        <p:txBody>
+          <a:bodyPr wrap="none" rtlCol="0">
+            <a:spAutoFit/>
+          </a:bodyPr>
+          <a:lstStyle/>
+          <a:p>
+            <a:r>
+              <a:rPr lang="en-US" dirty="0" err="1"/>
+              <a:t>Missisquoi</a:t>
+            </a:r>
+            <a:r>
+              <a:rPr lang="en-US" dirty="0"/>
+              <a:t> Bay </a:t>
+            </a:r>
+          </a:p>
+          <a:p>
+            <a:r>
+              <a:rPr lang="en-US" dirty="0"/>
+              <a:t>Winter 2014</a:t>
+            </a:r>
+          </a:p>
+        </p:txBody>
+      </p:sp>
+      <p:pic>
+        <p:nvPicPr>
+          <p:cNvPr id="24" name="Picture 23" descr="A picture containing screenshot&#13;&#10;&#13;&#10;Description automatically generated">
+            <a:extLst>
+              <a:ext uri="{FF2B5EF4-FFF2-40B4-BE49-F238E27FC236}">
+                <a16:creationId xmlns:a16="http://schemas.microsoft.com/office/drawing/2014/main" id="{40F877B1-7E74-CB47-8BF7-13866021057F}"/>
+              </a:ext>
+            </a:extLst>
+          </p:cNvPr>
+          <p:cNvPicPr>
+            <a:picLocks noChangeAspect="1"/>
+          </p:cNvPicPr>
+          <p:nvPr/>
+        </p:nvPicPr>
+        <p:blipFill>
+          <a:blip r:embed="rId2"/>
+          <a:stretch>
+            <a:fillRect/>
+          </a:stretch>
+        </p:blipFill>
+        <p:spPr>
+          <a:xfrm>
+            <a:off x="1960789" y="4011317"/>
+            <a:ext cx="5295567" cy="1323892"/>
+          </a:xfrm>
+          <a:prstGeom prst="rect">
+            <a:avLst/>
+          </a:prstGeom>
+        </p:spPr>
+      </p:pic>
+      <p:pic>
+        <p:nvPicPr>
+          <p:cNvPr id="26" name="Picture 25" descr="A screenshot of a social media post&#13;&#10;&#13;&#10;Description automatically generated">
+            <a:extLst>
+              <a:ext uri="{FF2B5EF4-FFF2-40B4-BE49-F238E27FC236}">
+                <a16:creationId xmlns:a16="http://schemas.microsoft.com/office/drawing/2014/main" id="{F5F5845D-330B-E94B-84B1-7E958791AA40}"/>
+              </a:ext>
+            </a:extLst>
+          </p:cNvPr>
+          <p:cNvPicPr>
+            <a:picLocks noChangeAspect="1"/>
+          </p:cNvPicPr>
+          <p:nvPr/>
+        </p:nvPicPr>
+        <p:blipFill>
+          <a:blip r:embed="rId3"/>
+          <a:stretch>
+            <a:fillRect/>
+          </a:stretch>
+        </p:blipFill>
+        <p:spPr>
+          <a:xfrm>
+            <a:off x="2088805" y="118348"/>
+            <a:ext cx="3964523" cy="1323892"/>
+          </a:xfrm>
+          <a:prstGeom prst="rect">
+            <a:avLst/>
+          </a:prstGeom>
+        </p:spPr>
+      </p:pic>
+      <p:pic>
+        <p:nvPicPr>
+          <p:cNvPr id="28" name="Picture 27" descr="A picture containing screenshot&#13;&#10;&#13;&#10;Description automatically generated">
+            <a:extLst>
+              <a:ext uri="{FF2B5EF4-FFF2-40B4-BE49-F238E27FC236}">
+                <a16:creationId xmlns:a16="http://schemas.microsoft.com/office/drawing/2014/main" id="{0960D878-63B3-A94F-BBE2-624192E84C62}"/>
+              </a:ext>
+            </a:extLst>
+          </p:cNvPr>
+          <p:cNvPicPr>
+            <a:picLocks noChangeAspect="1"/>
+          </p:cNvPicPr>
+          <p:nvPr/>
+        </p:nvPicPr>
+        <p:blipFill>
+          <a:blip r:embed="rId4"/>
+          <a:stretch>
+            <a:fillRect/>
+          </a:stretch>
+        </p:blipFill>
+        <p:spPr>
+          <a:xfrm>
+            <a:off x="2088806" y="1403861"/>
+            <a:ext cx="3964523" cy="1323892"/>
+          </a:xfrm>
+          <a:prstGeom prst="rect">
+            <a:avLst/>
+          </a:prstGeom>
+        </p:spPr>
+      </p:pic>
+      <p:pic>
+        <p:nvPicPr>
+          <p:cNvPr id="30" name="Picture 29" descr="A picture containing screenshot&#13;&#10;&#13;&#10;Description automatically generated">
+            <a:extLst>
+              <a:ext uri="{FF2B5EF4-FFF2-40B4-BE49-F238E27FC236}">
+                <a16:creationId xmlns:a16="http://schemas.microsoft.com/office/drawing/2014/main" id="{C6E1E832-4E9F-1541-B7B1-09DA6A6A7CC4}"/>
+              </a:ext>
+            </a:extLst>
+          </p:cNvPr>
+          <p:cNvPicPr>
+            <a:picLocks noChangeAspect="1"/>
+          </p:cNvPicPr>
+          <p:nvPr/>
+        </p:nvPicPr>
+        <p:blipFill>
+          <a:blip r:embed="rId5"/>
+          <a:stretch>
+            <a:fillRect/>
+          </a:stretch>
+        </p:blipFill>
+        <p:spPr>
+          <a:xfrm>
+            <a:off x="1960789" y="2706614"/>
+            <a:ext cx="5295567" cy="1323892"/>
+          </a:xfrm>
+          <a:prstGeom prst="rect">
+            <a:avLst/>
+          </a:prstGeom>
+        </p:spPr>
+      </p:pic>
+      <p:pic>
+        <p:nvPicPr>
+          <p:cNvPr id="32" name="Picture 31" descr="A picture containing screenshot&#13;&#10;&#13;&#10;Description automatically generated">
+            <a:extLst>
+              <a:ext uri="{FF2B5EF4-FFF2-40B4-BE49-F238E27FC236}">
+                <a16:creationId xmlns:a16="http://schemas.microsoft.com/office/drawing/2014/main" id="{3BEE6DB9-B00E-C14D-888A-39188F2B7205}"/>
+              </a:ext>
+            </a:extLst>
+          </p:cNvPr>
+          <p:cNvPicPr>
+            <a:picLocks noChangeAspect="1"/>
+          </p:cNvPicPr>
+          <p:nvPr/>
+        </p:nvPicPr>
+        <p:blipFill>
+          <a:blip r:embed="rId6"/>
+          <a:stretch>
+            <a:fillRect/>
+          </a:stretch>
+        </p:blipFill>
+        <p:spPr>
+          <a:xfrm>
+            <a:off x="1960790" y="5316020"/>
+            <a:ext cx="4787482" cy="1323892"/>
+          </a:xfrm>
+          <a:prstGeom prst="rect">
+            <a:avLst/>
+          </a:prstGeom>
+        </p:spPr>
+      </p:pic>
+      <p:cxnSp>
+        <p:nvCxnSpPr>
+          <p:cNvPr id="33" name="Straight Connector 32">
+            <a:extLst>
+              <a:ext uri="{FF2B5EF4-FFF2-40B4-BE49-F238E27FC236}">
+                <a16:creationId xmlns:a16="http://schemas.microsoft.com/office/drawing/2014/main" id="{73471CFF-FC7D-384D-88AC-2352E8FE6F53}"/>
+              </a:ext>
+            </a:extLst>
+          </p:cNvPr>
+          <p:cNvCxnSpPr>
+            <a:cxnSpLocks/>
+          </p:cNvCxnSpPr>
+          <p:nvPr/>
+        </p:nvCxnSpPr>
+        <p:spPr>
+          <a:xfrm>
+            <a:off x="5409591" y="118348"/>
+            <a:ext cx="0" cy="6521564"/>
+          </a:xfrm>
+          <a:prstGeom prst="line">
+            <a:avLst/>
+          </a:prstGeom>
+          <a:ln w="31750">
+            <a:solidFill>
+              <a:schemeClr val="tx1"/>
+            </a:solidFill>
+            <a:prstDash val="dash"/>
+          </a:ln>
+        </p:spPr>
+        <p:style>
+          <a:lnRef idx="2">
+            <a:schemeClr val="accent1"/>
+          </a:lnRef>
+          <a:fillRef idx="0">
+            <a:schemeClr val="accent1"/>
+          </a:fillRef>
+          <a:effectRef idx="1">
+            <a:schemeClr val="accent1"/>
+          </a:effectRef>
+          <a:fontRef idx="minor">
+            <a:schemeClr val="tx1"/>
+          </a:fontRef>
+        </p:style>
+      </p:cxnSp>
+    </p:spTree>
+    <p:extLst>
+      <p:ext uri="{BB962C8B-B14F-4D97-AF65-F5344CB8AC3E}">
+        <p14:creationId xmlns:p14="http://schemas.microsoft.com/office/powerpoint/2010/main" val="3344577536"/>
+      </p:ext>
+    </p:extLst>
+  </p:cSld>
+  <p:clrMapOvr>
+    <a:masterClrMapping/>
+  </p:clrMapOvr>
+</p:sld>
+</file>
+
+<file path=ppt/slides/slide2.xml><?xml version="1.0" encoding="utf-8"?>
+<p:sld xmlns:a="http://schemas.openxmlformats.org/drawingml/2006/main" xmlns:r="http://schemas.openxmlformats.org/officeDocument/2006/relationships" xmlns:p="http://schemas.openxmlformats.org/presentationml/2006/main">
+  <p:cSld>
+    <p:spTree>
+      <p:nvGrpSpPr>
+        <p:cNvPr id="1" name=""/>
+        <p:cNvGrpSpPr/>
+        <p:nvPr/>
+      </p:nvGrpSpPr>
+      <p:grpSpPr>
+        <a:xfrm>
+          <a:off x="0" y="0"/>
+          <a:ext cx="0" cy="0"/>
+          <a:chOff x="0" y="0"/>
+          <a:chExt cx="0" cy="0"/>
+        </a:xfrm>
+      </p:grpSpPr>
+      <p:sp>
+        <p:nvSpPr>
+          <p:cNvPr id="2" name="TextBox 1">
+            <a:extLst>
+              <a:ext uri="{FF2B5EF4-FFF2-40B4-BE49-F238E27FC236}">
+                <a16:creationId xmlns:a16="http://schemas.microsoft.com/office/drawing/2014/main" id="{D7381170-82A0-5C46-8265-862D4B982C6A}"/>
+              </a:ext>
+            </a:extLst>
+          </p:cNvPr>
+          <p:cNvSpPr txBox="1"/>
+          <p:nvPr/>
+        </p:nvSpPr>
+        <p:spPr>
+          <a:xfrm>
+            <a:off x="0" y="118348"/>
+            <a:ext cx="1616661" cy="646331"/>
+          </a:xfrm>
+          <a:prstGeom prst="rect">
+            <a:avLst/>
+          </a:prstGeom>
+          <a:noFill/>
+        </p:spPr>
+        <p:txBody>
+          <a:bodyPr wrap="none" rtlCol="0">
+            <a:spAutoFit/>
+          </a:bodyPr>
+          <a:lstStyle/>
+          <a:p>
+            <a:r>
+              <a:rPr lang="en-US" dirty="0" err="1"/>
+              <a:t>Missisquoi</a:t>
+            </a:r>
+            <a:r>
+              <a:rPr lang="en-US" dirty="0"/>
+              <a:t> Bay </a:t>
+            </a:r>
+          </a:p>
+          <a:p>
+            <a:r>
+              <a:rPr lang="en-US" dirty="0"/>
+              <a:t>Winter 2015</a:t>
+            </a:r>
+          </a:p>
+        </p:txBody>
+      </p:sp>
+      <p:pic>
+        <p:nvPicPr>
+          <p:cNvPr id="4" name="Picture 3" descr="A screenshot of a cell phone&#13;&#10;&#13;&#10;Description automatically generated">
+            <a:extLst>
+              <a:ext uri="{FF2B5EF4-FFF2-40B4-BE49-F238E27FC236}">
+                <a16:creationId xmlns:a16="http://schemas.microsoft.com/office/drawing/2014/main" id="{D42F3A4F-CE58-3E44-9877-1DFC8F6F5EA7}"/>
+              </a:ext>
+            </a:extLst>
+          </p:cNvPr>
+          <p:cNvPicPr>
+            <a:picLocks noChangeAspect="1"/>
+          </p:cNvPicPr>
+          <p:nvPr/>
+        </p:nvPicPr>
+        <p:blipFill>
+          <a:blip r:embed="rId2"/>
+          <a:stretch>
+            <a:fillRect/>
+          </a:stretch>
+        </p:blipFill>
+        <p:spPr>
+          <a:xfrm>
+            <a:off x="1920240" y="4206240"/>
+            <a:ext cx="5303520" cy="1325880"/>
+          </a:xfrm>
+          <a:prstGeom prst="rect">
+            <a:avLst/>
+          </a:prstGeom>
+        </p:spPr>
+      </p:pic>
+      <p:pic>
+        <p:nvPicPr>
+          <p:cNvPr id="6" name="Picture 5" descr="A screenshot of a social media post&#13;&#10;&#13;&#10;Description automatically generated">
+            <a:extLst>
+              <a:ext uri="{FF2B5EF4-FFF2-40B4-BE49-F238E27FC236}">
+                <a16:creationId xmlns:a16="http://schemas.microsoft.com/office/drawing/2014/main" id="{8FE238EF-17F6-B14D-B925-97F488DCD59A}"/>
+              </a:ext>
+            </a:extLst>
+          </p:cNvPr>
+          <p:cNvPicPr>
+            <a:picLocks noChangeAspect="1"/>
+          </p:cNvPicPr>
+          <p:nvPr/>
+        </p:nvPicPr>
+        <p:blipFill>
+          <a:blip r:embed="rId3"/>
+          <a:stretch>
+            <a:fillRect/>
+          </a:stretch>
+        </p:blipFill>
+        <p:spPr>
+          <a:xfrm>
+            <a:off x="2029968" y="228600"/>
+            <a:ext cx="4645152" cy="1325880"/>
+          </a:xfrm>
+          <a:prstGeom prst="rect">
+            <a:avLst/>
+          </a:prstGeom>
+        </p:spPr>
+      </p:pic>
+      <p:pic>
+        <p:nvPicPr>
+          <p:cNvPr id="8" name="Picture 7" descr="A picture containing screenshot&#13;&#10;&#13;&#10;Description automatically generated">
+            <a:extLst>
+              <a:ext uri="{FF2B5EF4-FFF2-40B4-BE49-F238E27FC236}">
+                <a16:creationId xmlns:a16="http://schemas.microsoft.com/office/drawing/2014/main" id="{B886222B-D094-084C-B6AB-1F389C71325C}"/>
+              </a:ext>
+            </a:extLst>
+          </p:cNvPr>
+          <p:cNvPicPr>
+            <a:picLocks noChangeAspect="1"/>
+          </p:cNvPicPr>
+          <p:nvPr/>
+        </p:nvPicPr>
+        <p:blipFill>
+          <a:blip r:embed="rId4"/>
+          <a:stretch>
+            <a:fillRect/>
+          </a:stretch>
+        </p:blipFill>
+        <p:spPr>
+          <a:xfrm>
+            <a:off x="2029968" y="1554480"/>
+            <a:ext cx="4645152" cy="1325880"/>
+          </a:xfrm>
+          <a:prstGeom prst="rect">
+            <a:avLst/>
+          </a:prstGeom>
+        </p:spPr>
+      </p:pic>
+      <p:pic>
+        <p:nvPicPr>
+          <p:cNvPr id="10" name="Picture 9" descr="A screenshot of a cell phone&#13;&#10;&#13;&#10;Description automatically generated">
+            <a:extLst>
+              <a:ext uri="{FF2B5EF4-FFF2-40B4-BE49-F238E27FC236}">
+                <a16:creationId xmlns:a16="http://schemas.microsoft.com/office/drawing/2014/main" id="{6B54704C-F8E7-0645-A250-E6E414C97AF8}"/>
+              </a:ext>
+            </a:extLst>
+          </p:cNvPr>
+          <p:cNvPicPr>
+            <a:picLocks noChangeAspect="1"/>
+          </p:cNvPicPr>
+          <p:nvPr/>
+        </p:nvPicPr>
+        <p:blipFill>
+          <a:blip r:embed="rId5"/>
+          <a:stretch>
+            <a:fillRect/>
+          </a:stretch>
+        </p:blipFill>
+        <p:spPr>
+          <a:xfrm>
+            <a:off x="1920240" y="2880360"/>
+            <a:ext cx="5303520" cy="1325880"/>
+          </a:xfrm>
+          <a:prstGeom prst="rect">
+            <a:avLst/>
+          </a:prstGeom>
+        </p:spPr>
+      </p:pic>
+      <p:pic>
+        <p:nvPicPr>
+          <p:cNvPr id="12" name="Picture 11" descr="A picture containing screenshot&#13;&#10;&#13;&#10;Description automatically generated">
+            <a:extLst>
+              <a:ext uri="{FF2B5EF4-FFF2-40B4-BE49-F238E27FC236}">
+                <a16:creationId xmlns:a16="http://schemas.microsoft.com/office/drawing/2014/main" id="{D8C5995C-AF6D-934C-A6D1-EEC6CECBE423}"/>
+              </a:ext>
+            </a:extLst>
+          </p:cNvPr>
+          <p:cNvPicPr>
+            <a:picLocks noChangeAspect="1"/>
+          </p:cNvPicPr>
+          <p:nvPr/>
+        </p:nvPicPr>
+        <p:blipFill>
+          <a:blip r:embed="rId6"/>
+          <a:stretch>
+            <a:fillRect/>
+          </a:stretch>
+        </p:blipFill>
+        <p:spPr>
+          <a:xfrm>
+            <a:off x="2029968" y="5532120"/>
+            <a:ext cx="4645151" cy="1325880"/>
+          </a:xfrm>
+          <a:prstGeom prst="rect">
+            <a:avLst/>
+          </a:prstGeom>
+        </p:spPr>
+      </p:pic>
+      <p:cxnSp>
+        <p:nvCxnSpPr>
+          <p:cNvPr id="13" name="Straight Connector 12">
+            <a:extLst>
+              <a:ext uri="{FF2B5EF4-FFF2-40B4-BE49-F238E27FC236}">
+                <a16:creationId xmlns:a16="http://schemas.microsoft.com/office/drawing/2014/main" id="{B43FFC08-0D75-114B-B837-FE6E1D68620F}"/>
+              </a:ext>
+            </a:extLst>
+          </p:cNvPr>
+          <p:cNvCxnSpPr>
+            <a:cxnSpLocks/>
+          </p:cNvCxnSpPr>
+          <p:nvPr/>
+        </p:nvCxnSpPr>
+        <p:spPr>
+          <a:xfrm>
+            <a:off x="4445988" y="118348"/>
+            <a:ext cx="0" cy="6521564"/>
+          </a:xfrm>
+          <a:prstGeom prst="line">
+            <a:avLst/>
+          </a:prstGeom>
+          <a:ln w="31750">
+            <a:solidFill>
+              <a:schemeClr val="tx1"/>
+            </a:solidFill>
+            <a:prstDash val="dash"/>
+          </a:ln>
+        </p:spPr>
+        <p:style>
+          <a:lnRef idx="2">
+            <a:schemeClr val="accent1"/>
+          </a:lnRef>
+          <a:fillRef idx="0">
+            <a:schemeClr val="accent1"/>
+          </a:fillRef>
+          <a:effectRef idx="1">
+            <a:schemeClr val="accent1"/>
+          </a:effectRef>
+          <a:fontRef idx="minor">
+            <a:schemeClr val="tx1"/>
+          </a:fontRef>
+        </p:style>
+      </p:cxnSp>
+      <p:cxnSp>
+        <p:nvCxnSpPr>
+          <p:cNvPr id="14" name="Straight Connector 13">
+            <a:extLst>
+              <a:ext uri="{FF2B5EF4-FFF2-40B4-BE49-F238E27FC236}">
+                <a16:creationId xmlns:a16="http://schemas.microsoft.com/office/drawing/2014/main" id="{7418FCA6-9132-A346-9BAE-A426C92FECD3}"/>
+              </a:ext>
+            </a:extLst>
+          </p:cNvPr>
+          <p:cNvCxnSpPr>
+            <a:cxnSpLocks/>
+          </p:cNvCxnSpPr>
+          <p:nvPr/>
+        </p:nvCxnSpPr>
+        <p:spPr>
+          <a:xfrm>
+            <a:off x="5545446" y="142798"/>
+            <a:ext cx="0" cy="6521564"/>
+          </a:xfrm>
+          <a:prstGeom prst="line">
+            <a:avLst/>
+          </a:prstGeom>
+          <a:ln w="31750">
+            <a:solidFill>
+              <a:schemeClr val="tx1"/>
+            </a:solidFill>
+            <a:prstDash val="dash"/>
+          </a:ln>
+        </p:spPr>
+        <p:style>
+          <a:lnRef idx="2">
+            <a:schemeClr val="accent1"/>
+          </a:lnRef>
+          <a:fillRef idx="0">
+            <a:schemeClr val="accent1"/>
+          </a:fillRef>
+          <a:effectRef idx="1">
+            <a:schemeClr val="accent1"/>
+          </a:effectRef>
+          <a:fontRef idx="minor">
+            <a:schemeClr val="tx1"/>
+          </a:fontRef>
+        </p:style>
+      </p:cxnSp>
+      <p:cxnSp>
+        <p:nvCxnSpPr>
+          <p:cNvPr id="15" name="Straight Connector 14">
+            <a:extLst>
+              <a:ext uri="{FF2B5EF4-FFF2-40B4-BE49-F238E27FC236}">
+                <a16:creationId xmlns:a16="http://schemas.microsoft.com/office/drawing/2014/main" id="{5658C231-60E9-BE4C-8E5C-50BBE0890722}"/>
+              </a:ext>
+            </a:extLst>
+          </p:cNvPr>
+          <p:cNvCxnSpPr>
+            <a:cxnSpLocks/>
+          </p:cNvCxnSpPr>
+          <p:nvPr/>
+        </p:nvCxnSpPr>
+        <p:spPr>
+          <a:xfrm>
+            <a:off x="6100617" y="142798"/>
+            <a:ext cx="0" cy="6521564"/>
+          </a:xfrm>
+          <a:prstGeom prst="line">
+            <a:avLst/>
+          </a:prstGeom>
+          <a:ln w="31750">
+            <a:solidFill>
+              <a:schemeClr val="tx1"/>
+            </a:solidFill>
+            <a:prstDash val="dash"/>
+          </a:ln>
+        </p:spPr>
+        <p:style>
+          <a:lnRef idx="2">
+            <a:schemeClr val="accent1"/>
+          </a:lnRef>
+          <a:fillRef idx="0">
+            <a:schemeClr val="accent1"/>
+          </a:fillRef>
+          <a:effectRef idx="1">
+            <a:schemeClr val="accent1"/>
+          </a:effectRef>
+          <a:fontRef idx="minor">
+            <a:schemeClr val="tx1"/>
+          </a:fontRef>
+        </p:style>
+      </p:cxnSp>
+    </p:spTree>
+    <p:extLst>
+      <p:ext uri="{BB962C8B-B14F-4D97-AF65-F5344CB8AC3E}">
+        <p14:creationId xmlns:p14="http://schemas.microsoft.com/office/powerpoint/2010/main" val="1437049838"/>
+      </p:ext>
+    </p:extLst>
+  </p:cSld>
+  <p:clrMapOvr>
+    <a:masterClrMapping/>
+  </p:clrMapOvr>
+</p:sld>
+</file>
+
+<file path=ppt/slides/slide3.xml><?xml version="1.0" encoding="utf-8"?>
+<p:sld xmlns:a="http://schemas.openxmlformats.org/drawingml/2006/main" xmlns:r="http://schemas.openxmlformats.org/officeDocument/2006/relationships" xmlns:p="http://schemas.openxmlformats.org/presentationml/2006/main">
+  <p:cSld>
+    <p:spTree>
+      <p:nvGrpSpPr>
+        <p:cNvPr id="1" name=""/>
+        <p:cNvGrpSpPr/>
+        <p:nvPr/>
+      </p:nvGrpSpPr>
+      <p:grpSpPr>
+        <a:xfrm>
+          <a:off x="0" y="0"/>
+          <a:ext cx="0" cy="0"/>
+          <a:chOff x="0" y="0"/>
+          <a:chExt cx="0" cy="0"/>
+        </a:xfrm>
+      </p:grpSpPr>
+      <p:sp>
+        <p:nvSpPr>
+          <p:cNvPr id="2" name="TextBox 1">
+            <a:extLst>
+              <a:ext uri="{FF2B5EF4-FFF2-40B4-BE49-F238E27FC236}">
+                <a16:creationId xmlns:a16="http://schemas.microsoft.com/office/drawing/2014/main" id="{ACDFB7E4-4832-DB4A-B9A7-D9F491EAFDCD}"/>
+              </a:ext>
+            </a:extLst>
+          </p:cNvPr>
+          <p:cNvSpPr txBox="1"/>
+          <p:nvPr/>
+        </p:nvSpPr>
+        <p:spPr>
+          <a:xfrm>
+            <a:off x="0" y="118348"/>
+            <a:ext cx="1674048" cy="646331"/>
+          </a:xfrm>
+          <a:prstGeom prst="rect">
+            <a:avLst/>
+          </a:prstGeom>
+          <a:noFill/>
+        </p:spPr>
+        <p:txBody>
+          <a:bodyPr wrap="none" rtlCol="0">
+            <a:spAutoFit/>
+          </a:bodyPr>
+          <a:lstStyle/>
+          <a:p>
+            <a:r>
+              <a:rPr lang="en-US" dirty="0"/>
+              <a:t>Shelburne Pond</a:t>
+            </a:r>
+          </a:p>
+          <a:p>
+            <a:r>
+              <a:rPr lang="en-US" dirty="0"/>
+              <a:t>Winter 2015</a:t>
+            </a:r>
+          </a:p>
+        </p:txBody>
+      </p:sp>
+    </p:spTree>
+    <p:extLst>
+      <p:ext uri="{BB962C8B-B14F-4D97-AF65-F5344CB8AC3E}">
+        <p14:creationId xmlns:p14="http://schemas.microsoft.com/office/powerpoint/2010/main" val="475994619"/>
+      </p:ext>
+    </p:extLst>
+  </p:cSld>
+  <p:clrMapOvr>
+    <a:masterClrMapping/>
+  </p:clrMapOvr>
+</p:sld>
+</file>
+
+<file path=ppt/slides/slide4.xml><?xml version="1.0" encoding="utf-8"?>
+<p:sld xmlns:a="http://schemas.openxmlformats.org/drawingml/2006/main" xmlns:r="http://schemas.openxmlformats.org/officeDocument/2006/relationships" xmlns:p="http://schemas.openxmlformats.org/presentationml/2006/main">
+  <p:cSld>
+    <p:spTree>
+      <p:nvGrpSpPr>
+        <p:cNvPr id="1" name=""/>
+        <p:cNvGrpSpPr/>
+        <p:nvPr/>
+      </p:nvGrpSpPr>
+      <p:grpSpPr>
+        <a:xfrm>
+          <a:off x="0" y="0"/>
+          <a:ext cx="0" cy="0"/>
+          <a:chOff x="0" y="0"/>
+          <a:chExt cx="0" cy="0"/>
+        </a:xfrm>
+      </p:grpSpPr>
       <p:pic>
         <p:nvPicPr>
           <p:cNvPr id="2" name="Picture 1" descr="2015_winterN_profiles_mp.png"/>
@@ -3259,10 +3954,9 @@
           <a:lstStyle/>
           <a:p>
             <a:r>
-              <a:rPr lang="en-US" dirty="0" smtClean="0"/>
+              <a:rPr lang="en-US" dirty="0"/>
               <a:t>Frozen</a:t>
             </a:r>
-            <a:endParaRPr lang="en-US" dirty="0"/>
           </a:p>
         </p:txBody>
       </p:sp>
@@ -3289,10 +3983,9 @@
           <a:lstStyle/>
           <a:p>
             <a:r>
-              <a:rPr lang="en-US" dirty="0" smtClean="0"/>
+              <a:rPr lang="en-US" dirty="0"/>
               <a:t>Thaw</a:t>
             </a:r>
-            <a:endParaRPr lang="en-US" dirty="0"/>
           </a:p>
         </p:txBody>
       </p:sp>
@@ -3483,22 +4176,21 @@
           <a:lstStyle/>
           <a:p>
             <a:r>
-              <a:rPr lang="en-US" dirty="0" err="1" smtClean="0"/>
+              <a:rPr lang="en-US" dirty="0" err="1"/>
               <a:t>Missisquoi</a:t>
             </a:r>
             <a:r>
-              <a:rPr lang="en-US" dirty="0" smtClean="0"/>
+              <a:rPr lang="en-US" dirty="0"/>
               <a:t> Bay </a:t>
             </a:r>
             <a:r>
-              <a:rPr lang="mr-IN" dirty="0" smtClean="0"/>
+              <a:rPr lang="mr-IN" dirty="0"/>
               <a:t>–</a:t>
             </a:r>
             <a:r>
-              <a:rPr lang="en-US" dirty="0" smtClean="0"/>
+              <a:rPr lang="en-US" dirty="0"/>
               <a:t> Winter 2014 &amp; 2015 Comparison - Nitrogen</a:t>
             </a:r>
-            <a:endParaRPr lang="en-US" dirty="0"/>
           </a:p>
         </p:txBody>
       </p:sp>
@@ -3551,7 +4243,7 @@
 </p:sld>
 </file>
 
-<file path=ppt/slides/slide2.xml><?xml version="1.0" encoding="utf-8"?>
+<file path=ppt/slides/slide5.xml><?xml version="1.0" encoding="utf-8"?>
 <p:sld xmlns:a="http://schemas.openxmlformats.org/drawingml/2006/main" xmlns:r="http://schemas.openxmlformats.org/officeDocument/2006/relationships" xmlns:p="http://schemas.openxmlformats.org/presentationml/2006/main">
   <p:cSld>
     <p:spTree>
@@ -3651,22 +4343,21 @@
           <a:lstStyle/>
           <a:p>
             <a:r>
-              <a:rPr lang="en-US" dirty="0" err="1" smtClean="0"/>
+              <a:rPr lang="en-US" dirty="0" err="1"/>
               <a:t>Missisquoi</a:t>
             </a:r>
             <a:r>
-              <a:rPr lang="en-US" dirty="0" smtClean="0"/>
+              <a:rPr lang="en-US" dirty="0"/>
               <a:t> Bay </a:t>
             </a:r>
             <a:r>
-              <a:rPr lang="mr-IN" dirty="0" smtClean="0"/>
+              <a:rPr lang="mr-IN" dirty="0"/>
               <a:t>–</a:t>
             </a:r>
             <a:r>
-              <a:rPr lang="en-US" dirty="0" smtClean="0"/>
+              <a:rPr lang="en-US" dirty="0"/>
               <a:t> each panel is a different sampling day; dashed lines are thaw events</a:t>
             </a:r>
-            <a:endParaRPr lang="en-US" dirty="0"/>
           </a:p>
         </p:txBody>
       </p:sp>
@@ -3693,10 +4384,9 @@
           <a:lstStyle/>
           <a:p>
             <a:r>
-              <a:rPr lang="en-US" dirty="0" smtClean="0"/>
+              <a:rPr lang="en-US" dirty="0"/>
               <a:t>Shelburne Pond</a:t>
             </a:r>
-            <a:endParaRPr lang="en-US" dirty="0"/>
           </a:p>
         </p:txBody>
       </p:sp>
@@ -3831,10 +4521,9 @@
           <a:lstStyle/>
           <a:p>
             <a:r>
-              <a:rPr lang="en-US" dirty="0" smtClean="0"/>
+              <a:rPr lang="en-US" dirty="0"/>
               <a:t>Frozen</a:t>
             </a:r>
-            <a:endParaRPr lang="en-US" dirty="0"/>
           </a:p>
         </p:txBody>
       </p:sp>
@@ -3861,10 +4550,9 @@
           <a:lstStyle/>
           <a:p>
             <a:r>
-              <a:rPr lang="en-US" dirty="0" smtClean="0"/>
+              <a:rPr lang="en-US" dirty="0"/>
               <a:t>Thaw</a:t>
             </a:r>
-            <a:endParaRPr lang="en-US" dirty="0"/>
           </a:p>
         </p:txBody>
       </p:sp>
@@ -4015,7 +4703,7 @@
 </p:sld>
 </file>
 
-<file path=ppt/slides/slide3.xml><?xml version="1.0" encoding="utf-8"?>
+<file path=ppt/slides/slide6.xml><?xml version="1.0" encoding="utf-8"?>
 <p:sld xmlns:a="http://schemas.openxmlformats.org/drawingml/2006/main" xmlns:r="http://schemas.openxmlformats.org/officeDocument/2006/relationships" xmlns:p="http://schemas.openxmlformats.org/presentationml/2006/main">
   <p:cSld>
     <p:spTree>
@@ -4056,10 +4744,9 @@
           <a:p>
             <a:pPr algn="ctr"/>
             <a:r>
-              <a:rPr lang="en-US" dirty="0" smtClean="0"/>
+              <a:rPr lang="en-US" dirty="0"/>
               <a:t>2014</a:t>
             </a:r>
-            <a:endParaRPr lang="en-US" dirty="0"/>
           </a:p>
         </p:txBody>
       </p:sp>
@@ -4086,10 +4773,9 @@
           <a:lstStyle/>
           <a:p>
             <a:r>
-              <a:rPr lang="en-US" sz="1200" dirty="0" smtClean="0"/>
+              <a:rPr lang="en-US" sz="1200" dirty="0"/>
               <a:t>Same data over time and grouped by depth (D1 = top, D5 = bottom)</a:t>
             </a:r>
-            <a:endParaRPr lang="en-US" sz="1200" dirty="0"/>
           </a:p>
         </p:txBody>
       </p:sp>
@@ -4116,22 +4802,21 @@
           <a:lstStyle/>
           <a:p>
             <a:r>
-              <a:rPr lang="en-US" dirty="0" err="1" smtClean="0"/>
+              <a:rPr lang="en-US" dirty="0" err="1"/>
               <a:t>Missisquoi</a:t>
             </a:r>
             <a:r>
-              <a:rPr lang="en-US" dirty="0" smtClean="0"/>
+              <a:rPr lang="en-US" dirty="0"/>
               <a:t> Bay </a:t>
             </a:r>
             <a:r>
-              <a:rPr lang="mr-IN" dirty="0" smtClean="0"/>
+              <a:rPr lang="mr-IN" dirty="0"/>
               <a:t>–</a:t>
             </a:r>
             <a:r>
-              <a:rPr lang="en-US" dirty="0" smtClean="0"/>
+              <a:rPr lang="en-US" dirty="0"/>
               <a:t> Winter 2014 &amp; 2015 Comparison - Nitrogen</a:t>
             </a:r>
-            <a:endParaRPr lang="en-US" dirty="0"/>
           </a:p>
         </p:txBody>
       </p:sp>
@@ -4219,10 +4904,9 @@
           <a:p>
             <a:pPr algn="ctr"/>
             <a:r>
-              <a:rPr lang="en-US" dirty="0" smtClean="0"/>
+              <a:rPr lang="en-US" dirty="0"/>
               <a:t>2015</a:t>
             </a:r>
-            <a:endParaRPr lang="en-US" dirty="0"/>
           </a:p>
         </p:txBody>
       </p:sp>
@@ -4239,7 +4923,7 @@
 </p:sld>
 </file>
 
-<file path=ppt/slides/slide4.xml><?xml version="1.0" encoding="utf-8"?>
+<file path=ppt/slides/slide7.xml><?xml version="1.0" encoding="utf-8"?>
 <p:sld xmlns:a="http://schemas.openxmlformats.org/drawingml/2006/main" xmlns:r="http://schemas.openxmlformats.org/officeDocument/2006/relationships" xmlns:p="http://schemas.openxmlformats.org/presentationml/2006/main">
   <p:cSld>
     <p:spTree>
@@ -4340,7 +5024,7 @@
           <a:p>
             <a:pPr algn="ctr"/>
             <a:r>
-              <a:rPr lang="en-US" dirty="0" err="1" smtClean="0"/>
+              <a:rPr lang="en-US" dirty="0" err="1"/>
               <a:t>Missisquoi</a:t>
             </a:r>
             <a:endParaRPr lang="en-US" dirty="0"/>
@@ -4371,10 +5055,9 @@
           <a:p>
             <a:pPr algn="ctr"/>
             <a:r>
-              <a:rPr lang="en-US" dirty="0" smtClean="0"/>
+              <a:rPr lang="en-US" dirty="0"/>
               <a:t>Shelburne</a:t>
             </a:r>
-            <a:endParaRPr lang="en-US" dirty="0"/>
           </a:p>
         </p:txBody>
       </p:sp>
@@ -4401,10 +5084,9 @@
           <a:lstStyle/>
           <a:p>
             <a:r>
-              <a:rPr lang="en-US" dirty="0" smtClean="0"/>
+              <a:rPr lang="en-US" dirty="0"/>
               <a:t>Same data over time and grouped by depth (D1 = top, D5 = bottom)</a:t>
             </a:r>
-            <a:endParaRPr lang="en-US" dirty="0"/>
           </a:p>
         </p:txBody>
       </p:sp>

</xml_diff>